<commit_message>
added some slides to the powerpoint
</commit_message>
<xml_diff>
--- a/presentation.pptx
+++ b/presentation.pptx
@@ -9,9 +9,10 @@
     <p:sldId id="257" r:id="rId3"/>
     <p:sldId id="258" r:id="rId4"/>
     <p:sldId id="259" r:id="rId5"/>
-    <p:sldId id="260" r:id="rId6"/>
-    <p:sldId id="261" r:id="rId7"/>
-    <p:sldId id="262" r:id="rId8"/>
+    <p:sldId id="263" r:id="rId6"/>
+    <p:sldId id="260" r:id="rId7"/>
+    <p:sldId id="261" r:id="rId8"/>
+    <p:sldId id="262" r:id="rId9"/>
   </p:sldIdLst>
   <p:sldSz cx="12192000" cy="6858000"/>
   <p:notesSz cx="6858000" cy="9144000"/>
@@ -110,6 +111,11 @@
       </a:defRPr>
     </a:lvl9pPr>
   </p:defaultTextStyle>
+  <p:extLst>
+    <p:ext uri="{EFAFB233-063F-42B5-8137-9DF3F51BA10A}">
+      <p15:sldGuideLst xmlns:p15="http://schemas.microsoft.com/office/powerpoint/2012/main"/>
+    </p:ext>
+  </p:extLst>
 </p:presentation>
 </file>
 
@@ -262,7 +268,7 @@
           <a:p>
             <a:fld id="{B65F9001-333C-4131-9A31-E5A96811B971}" type="datetimeFigureOut">
               <a:rPr lang="en-DK" smtClean="0"/>
-              <a:t>07/11/2019</a:t>
+              <a:t>11/07/2019</a:t>
             </a:fld>
             <a:endParaRPr lang="en-DK"/>
           </a:p>
@@ -462,7 +468,7 @@
           <a:p>
             <a:fld id="{B65F9001-333C-4131-9A31-E5A96811B971}" type="datetimeFigureOut">
               <a:rPr lang="en-DK" smtClean="0"/>
-              <a:t>07/11/2019</a:t>
+              <a:t>11/07/2019</a:t>
             </a:fld>
             <a:endParaRPr lang="en-DK"/>
           </a:p>
@@ -672,7 +678,7 @@
           <a:p>
             <a:fld id="{B65F9001-333C-4131-9A31-E5A96811B971}" type="datetimeFigureOut">
               <a:rPr lang="en-DK" smtClean="0"/>
-              <a:t>07/11/2019</a:t>
+              <a:t>11/07/2019</a:t>
             </a:fld>
             <a:endParaRPr lang="en-DK"/>
           </a:p>
@@ -872,7 +878,7 @@
           <a:p>
             <a:fld id="{B65F9001-333C-4131-9A31-E5A96811B971}" type="datetimeFigureOut">
               <a:rPr lang="en-DK" smtClean="0"/>
-              <a:t>07/11/2019</a:t>
+              <a:t>11/07/2019</a:t>
             </a:fld>
             <a:endParaRPr lang="en-DK"/>
           </a:p>
@@ -1148,7 +1154,7 @@
           <a:p>
             <a:fld id="{B65F9001-333C-4131-9A31-E5A96811B971}" type="datetimeFigureOut">
               <a:rPr lang="en-DK" smtClean="0"/>
-              <a:t>07/11/2019</a:t>
+              <a:t>11/07/2019</a:t>
             </a:fld>
             <a:endParaRPr lang="en-DK"/>
           </a:p>
@@ -1416,7 +1422,7 @@
           <a:p>
             <a:fld id="{B65F9001-333C-4131-9A31-E5A96811B971}" type="datetimeFigureOut">
               <a:rPr lang="en-DK" smtClean="0"/>
-              <a:t>07/11/2019</a:t>
+              <a:t>11/07/2019</a:t>
             </a:fld>
             <a:endParaRPr lang="en-DK"/>
           </a:p>
@@ -1831,7 +1837,7 @@
           <a:p>
             <a:fld id="{B65F9001-333C-4131-9A31-E5A96811B971}" type="datetimeFigureOut">
               <a:rPr lang="en-DK" smtClean="0"/>
-              <a:t>07/11/2019</a:t>
+              <a:t>11/07/2019</a:t>
             </a:fld>
             <a:endParaRPr lang="en-DK"/>
           </a:p>
@@ -1973,7 +1979,7 @@
           <a:p>
             <a:fld id="{B65F9001-333C-4131-9A31-E5A96811B971}" type="datetimeFigureOut">
               <a:rPr lang="en-DK" smtClean="0"/>
-              <a:t>07/11/2019</a:t>
+              <a:t>11/07/2019</a:t>
             </a:fld>
             <a:endParaRPr lang="en-DK"/>
           </a:p>
@@ -2086,7 +2092,7 @@
           <a:p>
             <a:fld id="{B65F9001-333C-4131-9A31-E5A96811B971}" type="datetimeFigureOut">
               <a:rPr lang="en-DK" smtClean="0"/>
-              <a:t>07/11/2019</a:t>
+              <a:t>11/07/2019</a:t>
             </a:fld>
             <a:endParaRPr lang="en-DK"/>
           </a:p>
@@ -2399,7 +2405,7 @@
           <a:p>
             <a:fld id="{B65F9001-333C-4131-9A31-E5A96811B971}" type="datetimeFigureOut">
               <a:rPr lang="en-DK" smtClean="0"/>
-              <a:t>07/11/2019</a:t>
+              <a:t>11/07/2019</a:t>
             </a:fld>
             <a:endParaRPr lang="en-DK"/>
           </a:p>
@@ -2688,7 +2694,7 @@
           <a:p>
             <a:fld id="{B65F9001-333C-4131-9A31-E5A96811B971}" type="datetimeFigureOut">
               <a:rPr lang="en-DK" smtClean="0"/>
-              <a:t>07/11/2019</a:t>
+              <a:t>11/07/2019</a:t>
             </a:fld>
             <a:endParaRPr lang="en-DK"/>
           </a:p>
@@ -2931,7 +2937,7 @@
           <a:p>
             <a:fld id="{B65F9001-333C-4131-9A31-E5A96811B971}" type="datetimeFigureOut">
               <a:rPr lang="en-DK" smtClean="0"/>
-              <a:t>07/11/2019</a:t>
+              <a:t>11/07/2019</a:t>
             </a:fld>
             <a:endParaRPr lang="en-DK"/>
           </a:p>
@@ -3571,6 +3577,17 @@
 <file path=ppt/slides/slide3.xml><?xml version="1.0" encoding="utf-8"?>
 <p:sld xmlns:a="http://schemas.openxmlformats.org/drawingml/2006/main" xmlns:r="http://schemas.openxmlformats.org/officeDocument/2006/relationships" xmlns:p="http://schemas.openxmlformats.org/presentationml/2006/main">
   <p:cSld>
+    <p:bg>
+      <p:bgPr>
+        <a:solidFill>
+          <a:schemeClr val="bg1">
+            <a:tint val="95000"/>
+            <a:satMod val="170000"/>
+          </a:schemeClr>
+        </a:solidFill>
+        <a:effectLst/>
+      </p:bgPr>
+    </p:bg>
     <p:spTree>
       <p:nvGrpSpPr>
         <p:cNvPr id="1" name=""/>
@@ -3601,18 +3618,21 @@
             <p:ph type="title"/>
           </p:nvPr>
         </p:nvSpPr>
-        <p:spPr/>
-        <p:txBody>
-          <a:bodyPr/>
-          <a:lstStyle/>
-          <a:p>
-            <a:r>
-              <a:rPr lang="da-DK" dirty="0" err="1"/>
-              <a:t>Spagetti</a:t>
-            </a:r>
+        <p:spPr>
+          <a:xfrm>
+            <a:off x="762001" y="803325"/>
+            <a:ext cx="5314536" cy="1325563"/>
+          </a:xfrm>
+        </p:spPr>
+        <p:txBody>
+          <a:bodyPr>
+            <a:normAutofit/>
+          </a:bodyPr>
+          <a:lstStyle/>
+          <a:p>
             <a:r>
               <a:rPr lang="da-DK" dirty="0"/>
-              <a:t> kode</a:t>
+              <a:t>Spagetti pattern™</a:t>
             </a:r>
             <a:endParaRPr lang="en-DK" dirty="0"/>
           </a:p>
@@ -3634,38 +3654,32 @@
             <p:ph idx="1"/>
           </p:nvPr>
         </p:nvSpPr>
-        <p:spPr/>
-        <p:txBody>
-          <a:bodyPr/>
-          <a:lstStyle/>
-          <a:p>
-            <a:r>
-              <a:rPr lang="da-DK" dirty="0"/>
+        <p:spPr>
+          <a:xfrm>
+            <a:off x="762000" y="2279018"/>
+            <a:ext cx="5314543" cy="3375920"/>
+          </a:xfrm>
+        </p:spPr>
+        <p:txBody>
+          <a:bodyPr anchor="t">
+            <a:normAutofit/>
+          </a:bodyPr>
+          <a:lstStyle/>
+          <a:p>
+            <a:r>
+              <a:rPr lang="da-DK" sz="1700"/>
               <a:t>Alle objekter kalder hinanden uden nogen videre former for struktur.</a:t>
             </a:r>
           </a:p>
           <a:p>
             <a:r>
-              <a:rPr lang="da-DK" dirty="0"/>
-              <a:t>Svære at opnå </a:t>
-            </a:r>
-            <a:r>
-              <a:rPr lang="da-DK" dirty="0" err="1"/>
-              <a:t>loose</a:t>
-            </a:r>
-            <a:r>
-              <a:rPr lang="da-DK" dirty="0"/>
-              <a:t> </a:t>
-            </a:r>
-            <a:r>
-              <a:rPr lang="da-DK" dirty="0" err="1"/>
-              <a:t>coupling</a:t>
-            </a:r>
-            <a:endParaRPr lang="da-DK" dirty="0"/>
-          </a:p>
-          <a:p>
-            <a:r>
-              <a:rPr lang="da-DK" dirty="0"/>
+              <a:rPr lang="da-DK" sz="1700"/>
+              <a:t>Svære at opnå loose coupling</a:t>
+            </a:r>
+          </a:p>
+          <a:p>
+            <a:r>
+              <a:rPr lang="da-DK" sz="1700"/>
               <a:t>Det er svære at udbygge / genbruge kode potentielt.</a:t>
             </a:r>
           </a:p>
@@ -3673,10 +3687,312 @@
             <a:pPr marL="0" indent="0">
               <a:buNone/>
             </a:pPr>
-            <a:endParaRPr lang="da-DK" dirty="0"/>
-          </a:p>
-        </p:txBody>
-      </p:sp>
+            <a:endParaRPr lang="da-DK" sz="1700"/>
+          </a:p>
+          <a:p>
+            <a:pPr marL="0" indent="0">
+              <a:buNone/>
+            </a:pPr>
+            <a:endParaRPr lang="da-DK" sz="1700"/>
+          </a:p>
+          <a:p>
+            <a:pPr marL="0" indent="0">
+              <a:buNone/>
+            </a:pPr>
+            <a:endParaRPr lang="da-DK" sz="1700"/>
+          </a:p>
+          <a:p>
+            <a:pPr marL="0" indent="0">
+              <a:buNone/>
+            </a:pPr>
+            <a:endParaRPr lang="da-DK" sz="1700"/>
+          </a:p>
+          <a:p>
+            <a:pPr marL="0" indent="0">
+              <a:buNone/>
+            </a:pPr>
+            <a:r>
+              <a:rPr lang="da-DK" sz="1700"/>
+              <a:t>*If it doesnt match any other pattern, its most likely spaghetti pattern ™ *</a:t>
+            </a:r>
+          </a:p>
+        </p:txBody>
+      </p:sp>
+      <p:sp>
+        <p:nvSpPr>
+          <p:cNvPr id="10" name="Freeform: Shape 9">
+            <a:extLst>
+              <a:ext uri="{FF2B5EF4-FFF2-40B4-BE49-F238E27FC236}">
+                <a16:creationId xmlns:a16="http://schemas.microsoft.com/office/drawing/2014/main" id="{CF62D2A7-8207-488C-9F46-316BA81A16C8}"/>
+              </a:ext>
+              <a:ext uri="{C183D7F6-B498-43B3-948B-1728B52AA6E4}">
+                <adec:decorative xmlns:adec="http://schemas.microsoft.com/office/drawing/2017/decorative" val="1"/>
+              </a:ext>
+            </a:extLst>
+          </p:cNvPr>
+          <p:cNvSpPr>
+            <a:spLocks noGrp="1" noRot="1" noChangeAspect="1" noMove="1" noResize="1" noEditPoints="1" noAdjustHandles="1" noChangeArrowheads="1" noChangeShapeType="1" noTextEdit="1"/>
+          </p:cNvSpPr>
+          <p:nvPr>
+            <p:extLst>
+              <p:ext uri="{386F3935-93C4-4BCD-93E2-E3B085C9AB24}">
+                <p16:designElem xmlns:p16="http://schemas.microsoft.com/office/powerpoint/2015/main" val="1"/>
+              </p:ext>
+            </p:extLst>
+          </p:nvPr>
+        </p:nvSpPr>
+        <p:spPr>
+          <a:xfrm flipH="1">
+            <a:off x="6582780" y="-2008"/>
+            <a:ext cx="5609220" cy="5840278"/>
+          </a:xfrm>
+          <a:custGeom>
+            <a:avLst/>
+            <a:gdLst>
+              <a:gd name="connsiteX0" fmla="*/ 0 w 5609220"/>
+              <a:gd name="connsiteY0" fmla="*/ 0 h 5840278"/>
+              <a:gd name="connsiteX1" fmla="*/ 4637091 w 5609220"/>
+              <a:gd name="connsiteY1" fmla="*/ 0 h 5840278"/>
+              <a:gd name="connsiteX2" fmla="*/ 4822569 w 5609220"/>
+              <a:gd name="connsiteY2" fmla="*/ 204077 h 5840278"/>
+              <a:gd name="connsiteX3" fmla="*/ 5609220 w 5609220"/>
+              <a:gd name="connsiteY3" fmla="*/ 2395363 h 5840278"/>
+              <a:gd name="connsiteX4" fmla="*/ 2164305 w 5609220"/>
+              <a:gd name="connsiteY4" fmla="*/ 5840278 h 5840278"/>
+              <a:gd name="connsiteX5" fmla="*/ 238220 w 5609220"/>
+              <a:gd name="connsiteY5" fmla="*/ 5251941 h 5840278"/>
+              <a:gd name="connsiteX6" fmla="*/ 0 w 5609220"/>
+              <a:gd name="connsiteY6" fmla="*/ 5073803 h 5840278"/>
+            </a:gdLst>
+            <a:ahLst/>
+            <a:cxnLst>
+              <a:cxn ang="0">
+                <a:pos x="connsiteX0" y="connsiteY0"/>
+              </a:cxn>
+              <a:cxn ang="0">
+                <a:pos x="connsiteX1" y="connsiteY1"/>
+              </a:cxn>
+              <a:cxn ang="0">
+                <a:pos x="connsiteX2" y="connsiteY2"/>
+              </a:cxn>
+              <a:cxn ang="0">
+                <a:pos x="connsiteX3" y="connsiteY3"/>
+              </a:cxn>
+              <a:cxn ang="0">
+                <a:pos x="connsiteX4" y="connsiteY4"/>
+              </a:cxn>
+              <a:cxn ang="0">
+                <a:pos x="connsiteX5" y="connsiteY5"/>
+              </a:cxn>
+              <a:cxn ang="0">
+                <a:pos x="connsiteX6" y="connsiteY6"/>
+              </a:cxn>
+            </a:cxnLst>
+            <a:rect l="l" t="t" r="r" b="b"/>
+            <a:pathLst>
+              <a:path w="5609220" h="5840278">
+                <a:moveTo>
+                  <a:pt x="0" y="0"/>
+                </a:moveTo>
+                <a:lnTo>
+                  <a:pt x="4637091" y="0"/>
+                </a:lnTo>
+                <a:lnTo>
+                  <a:pt x="4822569" y="204077"/>
+                </a:lnTo>
+                <a:cubicBezTo>
+                  <a:pt x="5314007" y="799562"/>
+                  <a:pt x="5609220" y="1562987"/>
+                  <a:pt x="5609220" y="2395363"/>
+                </a:cubicBezTo>
+                <a:cubicBezTo>
+                  <a:pt x="5609220" y="4297937"/>
+                  <a:pt x="4066879" y="5840278"/>
+                  <a:pt x="2164305" y="5840278"/>
+                </a:cubicBezTo>
+                <a:cubicBezTo>
+                  <a:pt x="1450840" y="5840278"/>
+                  <a:pt x="788032" y="5623387"/>
+                  <a:pt x="238220" y="5251941"/>
+                </a:cubicBezTo>
+                <a:lnTo>
+                  <a:pt x="0" y="5073803"/>
+                </a:lnTo>
+                <a:close/>
+              </a:path>
+            </a:pathLst>
+          </a:custGeom>
+          <a:solidFill>
+            <a:srgbClr val="FFFFFF">
+              <a:alpha val="80000"/>
+            </a:srgbClr>
+          </a:solidFill>
+          <a:ln>
+            <a:noFill/>
+          </a:ln>
+        </p:spPr>
+        <p:style>
+          <a:lnRef idx="2">
+            <a:schemeClr val="accent1">
+              <a:shade val="50000"/>
+            </a:schemeClr>
+          </a:lnRef>
+          <a:fillRef idx="1">
+            <a:schemeClr val="accent1"/>
+          </a:fillRef>
+          <a:effectRef idx="0">
+            <a:schemeClr val="accent1"/>
+          </a:effectRef>
+          <a:fontRef idx="minor">
+            <a:schemeClr val="lt1"/>
+          </a:fontRef>
+        </p:style>
+        <p:txBody>
+          <a:bodyPr rtlCol="0" anchor="ctr"/>
+          <a:lstStyle/>
+          <a:p>
+            <a:pPr marL="0" marR="0" lvl="0" indent="0" algn="ctr" defTabSz="914400" rtl="0" eaLnBrk="1" fontAlgn="auto" latinLnBrk="0" hangingPunct="1">
+              <a:lnSpc>
+                <a:spcPct val="100000"/>
+              </a:lnSpc>
+              <a:spcBef>
+                <a:spcPts val="0"/>
+              </a:spcBef>
+              <a:spcAft>
+                <a:spcPts val="0"/>
+              </a:spcAft>
+              <a:buClrTx/>
+              <a:buSzTx/>
+              <a:buFontTx/>
+              <a:buNone/>
+              <a:tabLst/>
+              <a:defRPr/>
+            </a:pPr>
+            <a:endParaRPr kumimoji="0" lang="en-US" sz="1800" b="0" i="0" u="none" strike="noStrike" kern="1200" cap="none" spc="0" normalizeH="0" baseline="0" noProof="0">
+              <a:ln>
+                <a:noFill/>
+              </a:ln>
+              <a:solidFill>
+                <a:prstClr val="white"/>
+              </a:solidFill>
+              <a:effectLst/>
+              <a:uLnTx/>
+              <a:uFillTx/>
+              <a:latin typeface="Calibri" panose="020F0502020204030204"/>
+              <a:ea typeface="+mn-ea"/>
+              <a:cs typeface="+mn-cs"/>
+            </a:endParaRPr>
+          </a:p>
+        </p:txBody>
+      </p:sp>
+      <p:pic>
+        <p:nvPicPr>
+          <p:cNvPr id="5" name="Picture 4">
+            <a:extLst>
+              <a:ext uri="{FF2B5EF4-FFF2-40B4-BE49-F238E27FC236}">
+                <a16:creationId xmlns:a16="http://schemas.microsoft.com/office/drawing/2014/main" id="{B0E88729-D69A-4E9A-95E1-4873CE34C3C7}"/>
+              </a:ext>
+            </a:extLst>
+          </p:cNvPr>
+          <p:cNvPicPr>
+            <a:picLocks noChangeAspect="1"/>
+          </p:cNvPicPr>
+          <p:nvPr/>
+        </p:nvPicPr>
+        <p:blipFill rotWithShape="1">
+          <a:blip r:embed="rId2">
+            <a:extLst>
+              <a:ext uri="{28A0092B-C50C-407E-A947-70E740481C1C}">
+                <a14:useLocalDpi xmlns:a14="http://schemas.microsoft.com/office/drawing/2010/main" val="0"/>
+              </a:ext>
+            </a:extLst>
+          </a:blip>
+          <a:srcRect r="4276" b="-2"/>
+          <a:stretch/>
+        </p:blipFill>
+        <p:spPr>
+          <a:xfrm>
+            <a:off x="6750141" y="-2"/>
+            <a:ext cx="5441859" cy="5654940"/>
+          </a:xfrm>
+          <a:custGeom>
+            <a:avLst/>
+            <a:gdLst>
+              <a:gd name="connsiteX0" fmla="*/ 1041368 w 5441859"/>
+              <a:gd name="connsiteY0" fmla="*/ 0 h 5654940"/>
+              <a:gd name="connsiteX1" fmla="*/ 5441859 w 5441859"/>
+              <a:gd name="connsiteY1" fmla="*/ 0 h 5654940"/>
+              <a:gd name="connsiteX2" fmla="*/ 5441859 w 5441859"/>
+              <a:gd name="connsiteY2" fmla="*/ 4820612 h 5654940"/>
+              <a:gd name="connsiteX3" fmla="*/ 5285166 w 5441859"/>
+              <a:gd name="connsiteY3" fmla="*/ 4957981 h 5654940"/>
+              <a:gd name="connsiteX4" fmla="*/ 3267719 w 5441859"/>
+              <a:gd name="connsiteY4" fmla="*/ 5654940 h 5654940"/>
+              <a:gd name="connsiteX5" fmla="*/ 0 w 5441859"/>
+              <a:gd name="connsiteY5" fmla="*/ 2387221 h 5654940"/>
+              <a:gd name="connsiteX6" fmla="*/ 957093 w 5441859"/>
+              <a:gd name="connsiteY6" fmla="*/ 76595 h 5654940"/>
+            </a:gdLst>
+            <a:ahLst/>
+            <a:cxnLst>
+              <a:cxn ang="0">
+                <a:pos x="connsiteX0" y="connsiteY0"/>
+              </a:cxn>
+              <a:cxn ang="0">
+                <a:pos x="connsiteX1" y="connsiteY1"/>
+              </a:cxn>
+              <a:cxn ang="0">
+                <a:pos x="connsiteX2" y="connsiteY2"/>
+              </a:cxn>
+              <a:cxn ang="0">
+                <a:pos x="connsiteX3" y="connsiteY3"/>
+              </a:cxn>
+              <a:cxn ang="0">
+                <a:pos x="connsiteX4" y="connsiteY4"/>
+              </a:cxn>
+              <a:cxn ang="0">
+                <a:pos x="connsiteX5" y="connsiteY5"/>
+              </a:cxn>
+              <a:cxn ang="0">
+                <a:pos x="connsiteX6" y="connsiteY6"/>
+              </a:cxn>
+            </a:cxnLst>
+            <a:rect l="l" t="t" r="r" b="b"/>
+            <a:pathLst>
+              <a:path w="5441859" h="5654940">
+                <a:moveTo>
+                  <a:pt x="1041368" y="0"/>
+                </a:moveTo>
+                <a:lnTo>
+                  <a:pt x="5441859" y="0"/>
+                </a:lnTo>
+                <a:lnTo>
+                  <a:pt x="5441859" y="4820612"/>
+                </a:lnTo>
+                <a:lnTo>
+                  <a:pt x="5285166" y="4957981"/>
+                </a:lnTo>
+                <a:cubicBezTo>
+                  <a:pt x="4729628" y="5394557"/>
+                  <a:pt x="4029081" y="5654940"/>
+                  <a:pt x="3267719" y="5654940"/>
+                </a:cubicBezTo>
+                <a:cubicBezTo>
+                  <a:pt x="1463008" y="5654940"/>
+                  <a:pt x="0" y="4191932"/>
+                  <a:pt x="0" y="2387221"/>
+                </a:cubicBezTo>
+                <a:cubicBezTo>
+                  <a:pt x="0" y="1484866"/>
+                  <a:pt x="365752" y="667936"/>
+                  <a:pt x="957093" y="76595"/>
+                </a:cubicBezTo>
+                <a:close/>
+              </a:path>
+            </a:pathLst>
+          </a:custGeom>
+        </p:spPr>
+      </p:pic>
     </p:spTree>
     <p:extLst>
       <p:ext uri="{BB962C8B-B14F-4D97-AF65-F5344CB8AC3E}">
@@ -3685,7 +4001,7 @@
     </p:extLst>
   </p:cSld>
   <p:clrMapOvr>
-    <a:masterClrMapping/>
+    <a:overrideClrMapping bg1="dk1" tx1="lt1" bg2="dk2" tx2="lt2" accent1="accent1" accent2="accent2" accent3="accent3" accent4="accent4" accent5="accent5" accent6="accent6" hlink="hlink" folHlink="folHlink"/>
   </p:clrMapOvr>
 </p:sld>
 </file>
@@ -3729,46 +4045,42 @@
           <a:lstStyle/>
           <a:p>
             <a:r>
+              <a:rPr lang="da-DK" dirty="0"/>
+              <a:t>Facade pattern</a:t>
+            </a:r>
+            <a:endParaRPr lang="en-DK" dirty="0"/>
+          </a:p>
+        </p:txBody>
+      </p:sp>
+      <p:sp>
+        <p:nvSpPr>
+          <p:cNvPr id="3" name="Content Placeholder 2">
+            <a:extLst>
+              <a:ext uri="{FF2B5EF4-FFF2-40B4-BE49-F238E27FC236}">
+                <a16:creationId xmlns:a16="http://schemas.microsoft.com/office/drawing/2014/main" id="{7902898C-DAB8-447F-9B18-E70D5A8FF079}"/>
+              </a:ext>
+            </a:extLst>
+          </p:cNvPr>
+          <p:cNvSpPr>
+            <a:spLocks noGrp="1"/>
+          </p:cNvSpPr>
+          <p:nvPr>
+            <p:ph idx="1"/>
+          </p:nvPr>
+        </p:nvSpPr>
+        <p:spPr/>
+        <p:txBody>
+          <a:bodyPr/>
+          <a:lstStyle/>
+          <a:p>
+            <a:r>
               <a:rPr lang="da-DK" dirty="0" err="1"/>
-              <a:t>Façade</a:t>
+              <a:t>Structural</a:t>
             </a:r>
             <a:r>
               <a:rPr lang="da-DK" dirty="0"/>
               <a:t> pattern</a:t>
             </a:r>
-            <a:endParaRPr lang="en-DK" dirty="0"/>
-          </a:p>
-        </p:txBody>
-      </p:sp>
-      <p:sp>
-        <p:nvSpPr>
-          <p:cNvPr id="3" name="Content Placeholder 2">
-            <a:extLst>
-              <a:ext uri="{FF2B5EF4-FFF2-40B4-BE49-F238E27FC236}">
-                <a16:creationId xmlns:a16="http://schemas.microsoft.com/office/drawing/2014/main" id="{7902898C-DAB8-447F-9B18-E70D5A8FF079}"/>
-              </a:ext>
-            </a:extLst>
-          </p:cNvPr>
-          <p:cNvSpPr>
-            <a:spLocks noGrp="1"/>
-          </p:cNvSpPr>
-          <p:nvPr>
-            <p:ph idx="1"/>
-          </p:nvPr>
-        </p:nvSpPr>
-        <p:spPr/>
-        <p:txBody>
-          <a:bodyPr/>
-          <a:lstStyle/>
-          <a:p>
-            <a:r>
-              <a:rPr lang="da-DK" dirty="0" err="1"/>
-              <a:t>Structural</a:t>
-            </a:r>
-            <a:r>
-              <a:rPr lang="da-DK" dirty="0"/>
-              <a:t> pattern</a:t>
-            </a:r>
           </a:p>
           <a:p>
             <a:r>
@@ -3809,6 +4121,36 @@
           </a:p>
         </p:txBody>
       </p:sp>
+      <p:pic>
+        <p:nvPicPr>
+          <p:cNvPr id="4" name="Picture 3">
+            <a:extLst>
+              <a:ext uri="{FF2B5EF4-FFF2-40B4-BE49-F238E27FC236}">
+                <a16:creationId xmlns:a16="http://schemas.microsoft.com/office/drawing/2014/main" id="{1483C712-C202-48FC-8415-C4AA4F30E2BA}"/>
+              </a:ext>
+            </a:extLst>
+          </p:cNvPr>
+          <p:cNvPicPr>
+            <a:picLocks noChangeAspect="1"/>
+          </p:cNvPicPr>
+          <p:nvPr/>
+        </p:nvPicPr>
+        <p:blipFill>
+          <a:blip r:embed="rId2"/>
+          <a:stretch>
+            <a:fillRect/>
+          </a:stretch>
+        </p:blipFill>
+        <p:spPr>
+          <a:xfrm>
+            <a:off x="7016712" y="4175716"/>
+            <a:ext cx="3857625" cy="1504950"/>
+          </a:xfrm>
+          <a:prstGeom prst="rect">
+            <a:avLst/>
+          </a:prstGeom>
+        </p:spPr>
+      </p:pic>
     </p:spTree>
     <p:extLst>
       <p:ext uri="{BB962C8B-B14F-4D97-AF65-F5344CB8AC3E}">
@@ -3844,7 +4186,7 @@
           <p:cNvPr id="2" name="Title 1">
             <a:extLst>
               <a:ext uri="{FF2B5EF4-FFF2-40B4-BE49-F238E27FC236}">
-                <a16:creationId xmlns:a16="http://schemas.microsoft.com/office/drawing/2014/main" id="{EC082B8B-6832-4384-B401-1FEC5EA4BA87}"/>
+                <a16:creationId xmlns:a16="http://schemas.microsoft.com/office/drawing/2014/main" id="{5A10FDCB-40DB-4E5D-BE99-C6449BF0784F}"/>
               </a:ext>
             </a:extLst>
           </p:cNvPr>
@@ -3861,71 +4203,113 @@
           <a:lstStyle/>
           <a:p>
             <a:r>
-              <a:rPr lang="da-DK" dirty="0" err="1"/>
-              <a:t>Mediator</a:t>
-            </a:r>
-            <a:r>
               <a:rPr lang="da-DK" dirty="0"/>
-              <a:t> pattern</a:t>
-            </a:r>
-            <a:endParaRPr lang="en-DK" dirty="0"/>
-          </a:p>
-        </p:txBody>
-      </p:sp>
-      <p:sp>
-        <p:nvSpPr>
-          <p:cNvPr id="3" name="Content Placeholder 2">
-            <a:extLst>
-              <a:ext uri="{FF2B5EF4-FFF2-40B4-BE49-F238E27FC236}">
-                <a16:creationId xmlns:a16="http://schemas.microsoft.com/office/drawing/2014/main" id="{87829F4E-B7AF-46DD-915F-E329F7C7AF20}"/>
-              </a:ext>
-            </a:extLst>
-          </p:cNvPr>
-          <p:cNvSpPr>
-            <a:spLocks noGrp="1"/>
-          </p:cNvSpPr>
+              <a:t>Facade</a:t>
+            </a:r>
+          </a:p>
+        </p:txBody>
+      </p:sp>
+      <p:pic>
+        <p:nvPicPr>
+          <p:cNvPr id="4" name="Content Placeholder 3">
+            <a:extLst>
+              <a:ext uri="{FF2B5EF4-FFF2-40B4-BE49-F238E27FC236}">
+                <a16:creationId xmlns:a16="http://schemas.microsoft.com/office/drawing/2014/main" id="{CC55C9C0-1160-47A0-94E3-7223214C29CA}"/>
+              </a:ext>
+            </a:extLst>
+          </p:cNvPr>
+          <p:cNvPicPr>
+            <a:picLocks noGrp="1" noChangeAspect="1"/>
+          </p:cNvPicPr>
           <p:nvPr>
             <p:ph idx="1"/>
           </p:nvPr>
-        </p:nvSpPr>
-        <p:spPr/>
-        <p:txBody>
-          <a:bodyPr/>
+        </p:nvPicPr>
+        <p:blipFill>
+          <a:blip r:embed="rId2"/>
+          <a:stretch>
+            <a:fillRect/>
+          </a:stretch>
+        </p:blipFill>
+        <p:spPr>
+          <a:xfrm>
+            <a:off x="5594830" y="2225675"/>
+            <a:ext cx="6467475" cy="4267200"/>
+          </a:xfrm>
+          <a:prstGeom prst="rect">
+            <a:avLst/>
+          </a:prstGeom>
+        </p:spPr>
+      </p:pic>
+      <p:sp>
+        <p:nvSpPr>
+          <p:cNvPr id="6" name="TextBox 5">
+            <a:extLst>
+              <a:ext uri="{FF2B5EF4-FFF2-40B4-BE49-F238E27FC236}">
+                <a16:creationId xmlns:a16="http://schemas.microsoft.com/office/drawing/2014/main" id="{FD6ABA81-A376-48A0-B944-7B0F5A2B216E}"/>
+              </a:ext>
+            </a:extLst>
+          </p:cNvPr>
+          <p:cNvSpPr txBox="1"/>
+          <p:nvPr/>
+        </p:nvSpPr>
+        <p:spPr>
+          <a:xfrm>
+            <a:off x="382772" y="1496517"/>
+            <a:ext cx="5212058" cy="1754326"/>
+          </a:xfrm>
+          <a:prstGeom prst="rect">
+            <a:avLst/>
+          </a:prstGeom>
+          <a:noFill/>
+        </p:spPr>
+        <p:txBody>
+          <a:bodyPr wrap="square" rtlCol="0">
+            <a:spAutoFit/>
+          </a:bodyPr>
           <a:lstStyle/>
           <a:p>
             <a:r>
               <a:rPr lang="da-DK" dirty="0"/>
-              <a:t>Sørger for </a:t>
-            </a:r>
-            <a:r>
-              <a:rPr lang="da-DK" dirty="0" err="1"/>
-              <a:t>loose</a:t>
-            </a:r>
+              <a:t>1. Bruger får en ide</a:t>
+            </a:r>
+          </a:p>
+          <a:p>
             <a:r>
               <a:rPr lang="da-DK" dirty="0"/>
-              <a:t> </a:t>
-            </a:r>
-            <a:r>
-              <a:rPr lang="da-DK" dirty="0" err="1"/>
-              <a:t>coupling</a:t>
-            </a:r>
-            <a:endParaRPr lang="da-DK" dirty="0"/>
+              <a:t>2. Trykker på knappen</a:t>
+            </a:r>
           </a:p>
           <a:p>
             <a:r>
               <a:rPr lang="da-DK" dirty="0"/>
-              <a:t>Søger for at forskellige objekter kan snakke sammen uden at kende til hinanden.</a:t>
-            </a:r>
-          </a:p>
-          <a:p>
-            <a:endParaRPr lang="en-DK" dirty="0"/>
+              <a:t>3. Knappen siger ”i’m out of ideas”</a:t>
+            </a:r>
+          </a:p>
+          <a:p>
+            <a:r>
+              <a:rPr lang="da-DK" dirty="0"/>
+              <a:t>4. Knappen kalder facaden</a:t>
+            </a:r>
+          </a:p>
+          <a:p>
+            <a:r>
+              <a:rPr lang="da-DK" dirty="0"/>
+              <a:t>5. Facaden tænker for lyset i pæren</a:t>
+            </a:r>
+          </a:p>
+          <a:p>
+            <a:r>
+              <a:rPr lang="da-DK" dirty="0"/>
+              <a:t>6. Muse bliver started og kører i 5 sekunder</a:t>
+            </a:r>
           </a:p>
         </p:txBody>
       </p:sp>
     </p:spTree>
     <p:extLst>
       <p:ext uri="{BB962C8B-B14F-4D97-AF65-F5344CB8AC3E}">
-        <p14:creationId xmlns:p14="http://schemas.microsoft.com/office/powerpoint/2010/main" val="2898218279"/>
+        <p14:creationId xmlns:p14="http://schemas.microsoft.com/office/powerpoint/2010/main" val="2786163451"/>
       </p:ext>
     </p:extLst>
   </p:cSld>
@@ -3957,6 +4341,119 @@
           <p:cNvPr id="2" name="Title 1">
             <a:extLst>
               <a:ext uri="{FF2B5EF4-FFF2-40B4-BE49-F238E27FC236}">
+                <a16:creationId xmlns:a16="http://schemas.microsoft.com/office/drawing/2014/main" id="{EC082B8B-6832-4384-B401-1FEC5EA4BA87}"/>
+              </a:ext>
+            </a:extLst>
+          </p:cNvPr>
+          <p:cNvSpPr>
+            <a:spLocks noGrp="1"/>
+          </p:cNvSpPr>
+          <p:nvPr>
+            <p:ph type="title"/>
+          </p:nvPr>
+        </p:nvSpPr>
+        <p:spPr/>
+        <p:txBody>
+          <a:bodyPr/>
+          <a:lstStyle/>
+          <a:p>
+            <a:r>
+              <a:rPr lang="da-DK" dirty="0" err="1"/>
+              <a:t>Mediator</a:t>
+            </a:r>
+            <a:r>
+              <a:rPr lang="da-DK" dirty="0"/>
+              <a:t> pattern</a:t>
+            </a:r>
+            <a:endParaRPr lang="en-DK" dirty="0"/>
+          </a:p>
+        </p:txBody>
+      </p:sp>
+      <p:sp>
+        <p:nvSpPr>
+          <p:cNvPr id="3" name="Content Placeholder 2">
+            <a:extLst>
+              <a:ext uri="{FF2B5EF4-FFF2-40B4-BE49-F238E27FC236}">
+                <a16:creationId xmlns:a16="http://schemas.microsoft.com/office/drawing/2014/main" id="{87829F4E-B7AF-46DD-915F-E329F7C7AF20}"/>
+              </a:ext>
+            </a:extLst>
+          </p:cNvPr>
+          <p:cNvSpPr>
+            <a:spLocks noGrp="1"/>
+          </p:cNvSpPr>
+          <p:nvPr>
+            <p:ph idx="1"/>
+          </p:nvPr>
+        </p:nvSpPr>
+        <p:spPr/>
+        <p:txBody>
+          <a:bodyPr/>
+          <a:lstStyle/>
+          <a:p>
+            <a:r>
+              <a:rPr lang="da-DK" dirty="0"/>
+              <a:t>Sørger for </a:t>
+            </a:r>
+            <a:r>
+              <a:rPr lang="da-DK" dirty="0" err="1"/>
+              <a:t>loose</a:t>
+            </a:r>
+            <a:r>
+              <a:rPr lang="da-DK" dirty="0"/>
+              <a:t> </a:t>
+            </a:r>
+            <a:r>
+              <a:rPr lang="da-DK" dirty="0" err="1"/>
+              <a:t>coupling</a:t>
+            </a:r>
+            <a:endParaRPr lang="da-DK" dirty="0"/>
+          </a:p>
+          <a:p>
+            <a:r>
+              <a:rPr lang="da-DK" dirty="0"/>
+              <a:t>Søger for at forskellige objekter kan snakke sammen uden at kende til hinanden.</a:t>
+            </a:r>
+          </a:p>
+          <a:p>
+            <a:endParaRPr lang="en-DK" dirty="0"/>
+          </a:p>
+        </p:txBody>
+      </p:sp>
+    </p:spTree>
+    <p:extLst>
+      <p:ext uri="{BB962C8B-B14F-4D97-AF65-F5344CB8AC3E}">
+        <p14:creationId xmlns:p14="http://schemas.microsoft.com/office/powerpoint/2010/main" val="2898218279"/>
+      </p:ext>
+    </p:extLst>
+  </p:cSld>
+  <p:clrMapOvr>
+    <a:masterClrMapping/>
+  </p:clrMapOvr>
+</p:sld>
+</file>
+
+<file path=ppt/slides/slide7.xml><?xml version="1.0" encoding="utf-8"?>
+<p:sld xmlns:a="http://schemas.openxmlformats.org/drawingml/2006/main" xmlns:r="http://schemas.openxmlformats.org/officeDocument/2006/relationships" xmlns:p="http://schemas.openxmlformats.org/presentationml/2006/main">
+  <p:cSld>
+    <p:spTree>
+      <p:nvGrpSpPr>
+        <p:cNvPr id="1" name=""/>
+        <p:cNvGrpSpPr/>
+        <p:nvPr/>
+      </p:nvGrpSpPr>
+      <p:grpSpPr>
+        <a:xfrm>
+          <a:off x="0" y="0"/>
+          <a:ext cx="0" cy="0"/>
+          <a:chOff x="0" y="0"/>
+          <a:chExt cx="0" cy="0"/>
+        </a:xfrm>
+      </p:grpSpPr>
+      <p:sp>
+        <p:nvSpPr>
+          <p:cNvPr id="2" name="Title 1">
+            <a:extLst>
+              <a:ext uri="{FF2B5EF4-FFF2-40B4-BE49-F238E27FC236}">
                 <a16:creationId xmlns:a16="http://schemas.microsoft.com/office/drawing/2014/main" id="{960CAD48-A118-46B9-B58C-965C22E3C0F2}"/>
               </a:ext>
             </a:extLst>
@@ -4225,7 +4722,7 @@
 </p:sld>
 </file>
 
-<file path=ppt/slides/slide7.xml><?xml version="1.0" encoding="utf-8"?>
+<file path=ppt/slides/slide8.xml><?xml version="1.0" encoding="utf-8"?>
 <p:sld xmlns:a="http://schemas.openxmlformats.org/drawingml/2006/main" xmlns:r="http://schemas.openxmlformats.org/officeDocument/2006/relationships" xmlns:p="http://schemas.openxmlformats.org/presentationml/2006/main">
   <p:cSld>
     <p:spTree>

</xml_diff>